<commit_message>
Do a little adjustment to the LoanListPanelView.pptx and png
</commit_message>
<xml_diff>
--- a/docs/diagrams/LoanListPanelView.pptx
+++ b/docs/diagrams/LoanListPanelView.pptx
@@ -3328,10 +3328,10 @@
       </p:grpSpPr>
       <p:grpSp>
         <p:nvGrpSpPr>
-          <p:cNvPr id="8" name="Group 7">
-            <a:extLst>
-              <a:ext uri="{FF2B5EF4-FFF2-40B4-BE49-F238E27FC236}">
-                <a16:creationId xmlns:a16="http://schemas.microsoft.com/office/drawing/2014/main" id="{FC25EB90-0AF4-A94D-B8BD-BB380AADEA44}"/>
+          <p:cNvPr id="4" name="Group 3">
+            <a:extLst>
+              <a:ext uri="{FF2B5EF4-FFF2-40B4-BE49-F238E27FC236}">
+                <a16:creationId xmlns:a16="http://schemas.microsoft.com/office/drawing/2014/main" id="{5174D6D3-F821-C34D-B2B2-3356C293FFF8}"/>
               </a:ext>
             </a:extLst>
           </p:cNvPr>
@@ -3342,104 +3342,235 @@
           <a:xfrm>
             <a:off x="1256935" y="1005840"/>
             <a:ext cx="2505167" cy="2468880"/>
-            <a:chOff x="1178558" y="940525"/>
-            <a:chExt cx="4529736" cy="4376058"/>
+            <a:chOff x="1256935" y="1005840"/>
+            <a:chExt cx="2505167" cy="2468880"/>
           </a:xfrm>
         </p:grpSpPr>
-        <p:pic>
-          <p:nvPicPr>
-            <p:cNvPr id="3" name="Picture 2">
+        <p:grpSp>
+          <p:nvGrpSpPr>
+            <p:cNvPr id="8" name="Group 7">
               <a:extLst>
                 <a:ext uri="{FF2B5EF4-FFF2-40B4-BE49-F238E27FC236}">
-                  <a16:creationId xmlns:a16="http://schemas.microsoft.com/office/drawing/2014/main" id="{CDCA4A0A-7BD5-AB4C-A628-61AF464751E0}"/>
+                  <a16:creationId xmlns:a16="http://schemas.microsoft.com/office/drawing/2014/main" id="{FC25EB90-0AF4-A94D-B8BD-BB380AADEA44}"/>
                 </a:ext>
               </a:extLst>
             </p:cNvPr>
-            <p:cNvPicPr>
-              <a:picLocks noChangeAspect="1"/>
-            </p:cNvPicPr>
+            <p:cNvGrpSpPr/>
             <p:nvPr/>
-          </p:nvPicPr>
-          <p:blipFill rotWithShape="1">
-            <a:blip r:embed="rId2"/>
-            <a:srcRect t="37606" r="56465" b="7404"/>
-            <a:stretch/>
-          </p:blipFill>
+          </p:nvGrpSpPr>
+          <p:grpSpPr>
+            <a:xfrm>
+              <a:off x="1256935" y="1005840"/>
+              <a:ext cx="2505167" cy="2468880"/>
+              <a:chOff x="1178558" y="940525"/>
+              <a:chExt cx="4529736" cy="4376058"/>
+            </a:xfrm>
+          </p:grpSpPr>
+          <p:pic>
+            <p:nvPicPr>
+              <p:cNvPr id="3" name="Picture 2">
+                <a:extLst>
+                  <a:ext uri="{FF2B5EF4-FFF2-40B4-BE49-F238E27FC236}">
+                    <a16:creationId xmlns:a16="http://schemas.microsoft.com/office/drawing/2014/main" id="{CDCA4A0A-7BD5-AB4C-A628-61AF464751E0}"/>
+                  </a:ext>
+                </a:extLst>
+              </p:cNvPr>
+              <p:cNvPicPr>
+                <a:picLocks noChangeAspect="1"/>
+              </p:cNvPicPr>
+              <p:nvPr/>
+            </p:nvPicPr>
+            <p:blipFill rotWithShape="1">
+              <a:blip r:embed="rId2"/>
+              <a:srcRect t="37606" r="56465" b="7404"/>
+              <a:stretch/>
+            </p:blipFill>
+            <p:spPr>
+              <a:xfrm>
+                <a:off x="1178558" y="940525"/>
+                <a:ext cx="4529736" cy="4376058"/>
+              </a:xfrm>
+              <a:prstGeom prst="rect">
+                <a:avLst/>
+              </a:prstGeom>
+              <a:ln>
+                <a:solidFill>
+                  <a:srgbClr val="444C5D"/>
+                </a:solidFill>
+              </a:ln>
+            </p:spPr>
+          </p:pic>
+          <p:pic>
+            <p:nvPicPr>
+              <p:cNvPr id="5" name="Picture 4">
+                <a:extLst>
+                  <a:ext uri="{FF2B5EF4-FFF2-40B4-BE49-F238E27FC236}">
+                    <a16:creationId xmlns:a16="http://schemas.microsoft.com/office/drawing/2014/main" id="{BD4EBB94-CEF6-ED47-BAD0-A5DA7AE6E667}"/>
+                  </a:ext>
+                </a:extLst>
+              </p:cNvPr>
+              <p:cNvPicPr>
+                <a:picLocks noChangeAspect="1"/>
+              </p:cNvPicPr>
+              <p:nvPr/>
+            </p:nvPicPr>
+            <p:blipFill>
+              <a:blip r:embed="rId3"/>
+              <a:stretch>
+                <a:fillRect/>
+              </a:stretch>
+            </p:blipFill>
+            <p:spPr>
+              <a:xfrm>
+                <a:off x="3561805" y="3128554"/>
+                <a:ext cx="1793965" cy="386201"/>
+              </a:xfrm>
+              <a:prstGeom prst="rect">
+                <a:avLst/>
+              </a:prstGeom>
+            </p:spPr>
+          </p:pic>
+          <p:pic>
+            <p:nvPicPr>
+              <p:cNvPr id="7" name="Picture 6">
+                <a:extLst>
+                  <a:ext uri="{FF2B5EF4-FFF2-40B4-BE49-F238E27FC236}">
+                    <a16:creationId xmlns:a16="http://schemas.microsoft.com/office/drawing/2014/main" id="{13D32A14-6B6B-4144-9AC7-45FFD7596FAA}"/>
+                  </a:ext>
+                </a:extLst>
+              </p:cNvPr>
+              <p:cNvPicPr>
+                <a:picLocks noChangeAspect="1"/>
+              </p:cNvPicPr>
+              <p:nvPr/>
+            </p:nvPicPr>
+            <p:blipFill>
+              <a:blip r:embed="rId4"/>
+              <a:stretch>
+                <a:fillRect/>
+              </a:stretch>
+            </p:blipFill>
+            <p:spPr>
+              <a:xfrm>
+                <a:off x="3561804" y="1672590"/>
+                <a:ext cx="1793965" cy="326027"/>
+              </a:xfrm>
+              <a:prstGeom prst="rect">
+                <a:avLst/>
+              </a:prstGeom>
+            </p:spPr>
+          </p:pic>
+        </p:grpSp>
+        <p:sp>
+          <p:nvSpPr>
+            <p:cNvPr id="2" name="TextBox 1">
+              <a:extLst>
+                <a:ext uri="{FF2B5EF4-FFF2-40B4-BE49-F238E27FC236}">
+                  <a16:creationId xmlns:a16="http://schemas.microsoft.com/office/drawing/2014/main" id="{C3E986FA-07B3-CA4C-A75B-B7C2D837490F}"/>
+                </a:ext>
+              </a:extLst>
+            </p:cNvPr>
+            <p:cNvSpPr txBox="1"/>
+            <p:nvPr/>
+          </p:nvSpPr>
           <p:spPr>
             <a:xfrm>
-              <a:off x="1178558" y="940525"/>
-              <a:ext cx="4529736" cy="4376058"/>
+              <a:off x="2509517" y="1418856"/>
+              <a:ext cx="1187115" cy="230832"/>
             </a:xfrm>
             <a:prstGeom prst="rect">
               <a:avLst/>
             </a:prstGeom>
-            <a:ln>
-              <a:solidFill>
-                <a:srgbClr val="444C5D"/>
-              </a:solidFill>
-            </a:ln>
+            <a:noFill/>
           </p:spPr>
-        </p:pic>
-        <p:pic>
-          <p:nvPicPr>
-            <p:cNvPr id="5" name="Picture 4">
+          <p:txBody>
+            <a:bodyPr wrap="square" rtlCol="0">
+              <a:spAutoFit/>
+            </a:bodyPr>
+            <a:lstStyle/>
+            <a:p>
+              <a:r>
+                <a:rPr lang="en-US" sz="900" dirty="0">
+                  <a:solidFill>
+                    <a:schemeClr val="bg1"/>
+                  </a:solidFill>
+                </a:rPr>
+                <a:t>(</a:t>
+              </a:r>
+              <a:r>
+                <a:rPr lang="en-US" sz="900" dirty="0" err="1">
+                  <a:solidFill>
+                    <a:schemeClr val="bg1"/>
+                  </a:solidFill>
+                </a:rPr>
+                <a:t>Nric</a:t>
+              </a:r>
+              <a:r>
+                <a:rPr lang="en-US" sz="900" dirty="0">
+                  <a:solidFill>
+                    <a:schemeClr val="bg1"/>
+                  </a:solidFill>
+                </a:rPr>
+                <a:t>: Gxxxxx67U)</a:t>
+              </a:r>
+            </a:p>
+          </p:txBody>
+        </p:sp>
+        <p:sp>
+          <p:nvSpPr>
+            <p:cNvPr id="9" name="TextBox 8">
               <a:extLst>
                 <a:ext uri="{FF2B5EF4-FFF2-40B4-BE49-F238E27FC236}">
-                  <a16:creationId xmlns:a16="http://schemas.microsoft.com/office/drawing/2014/main" id="{BD4EBB94-CEF6-ED47-BAD0-A5DA7AE6E667}"/>
+                  <a16:creationId xmlns:a16="http://schemas.microsoft.com/office/drawing/2014/main" id="{B0C0BE12-3317-A24E-BD07-68409370B583}"/>
                 </a:ext>
               </a:extLst>
             </p:cNvPr>
-            <p:cNvPicPr>
-              <a:picLocks noChangeAspect="1"/>
-            </p:cNvPicPr>
+            <p:cNvSpPr txBox="1"/>
             <p:nvPr/>
-          </p:nvPicPr>
-          <p:blipFill>
-            <a:blip r:embed="rId3"/>
-            <a:stretch>
-              <a:fillRect/>
-            </a:stretch>
-          </p:blipFill>
+          </p:nvSpPr>
           <p:spPr>
             <a:xfrm>
-              <a:off x="3561805" y="3128554"/>
-              <a:ext cx="1793965" cy="386201"/>
+              <a:off x="2509518" y="2212980"/>
+              <a:ext cx="1187115" cy="230832"/>
             </a:xfrm>
             <a:prstGeom prst="rect">
               <a:avLst/>
             </a:prstGeom>
+            <a:noFill/>
           </p:spPr>
-        </p:pic>
-        <p:pic>
-          <p:nvPicPr>
-            <p:cNvPr id="7" name="Picture 6">
-              <a:extLst>
-                <a:ext uri="{FF2B5EF4-FFF2-40B4-BE49-F238E27FC236}">
-                  <a16:creationId xmlns:a16="http://schemas.microsoft.com/office/drawing/2014/main" id="{13D32A14-6B6B-4144-9AC7-45FFD7596FAA}"/>
-                </a:ext>
-              </a:extLst>
-            </p:cNvPr>
-            <p:cNvPicPr>
-              <a:picLocks noChangeAspect="1"/>
-            </p:cNvPicPr>
-            <p:nvPr/>
-          </p:nvPicPr>
-          <p:blipFill>
-            <a:blip r:embed="rId4"/>
-            <a:stretch>
-              <a:fillRect/>
-            </a:stretch>
-          </p:blipFill>
-          <p:spPr>
-            <a:xfrm>
-              <a:off x="3561804" y="1672590"/>
-              <a:ext cx="1793965" cy="326027"/>
-            </a:xfrm>
-            <a:prstGeom prst="rect">
-              <a:avLst/>
-            </a:prstGeom>
-          </p:spPr>
-        </p:pic>
+          <p:txBody>
+            <a:bodyPr wrap="square" rtlCol="0">
+              <a:spAutoFit/>
+            </a:bodyPr>
+            <a:lstStyle/>
+            <a:p>
+              <a:r>
+                <a:rPr lang="en-US" sz="900" dirty="0">
+                  <a:solidFill>
+                    <a:schemeClr val="bg1"/>
+                  </a:solidFill>
+                </a:rPr>
+                <a:t>(</a:t>
+              </a:r>
+              <a:r>
+                <a:rPr lang="en-US" sz="900" dirty="0" err="1">
+                  <a:solidFill>
+                    <a:schemeClr val="bg1"/>
+                  </a:solidFill>
+                </a:rPr>
+                <a:t>Nric</a:t>
+              </a:r>
+              <a:r>
+                <a:rPr lang="en-US" sz="900" dirty="0">
+                  <a:solidFill>
+                    <a:schemeClr val="bg1"/>
+                  </a:solidFill>
+                </a:rPr>
+                <a:t>: Gxxxxx89U)</a:t>
+              </a:r>
+            </a:p>
+          </p:txBody>
+        </p:sp>
       </p:grpSp>
     </p:spTree>
     <p:extLst>

</xml_diff>